<commit_message>
upload course intro for 2019-spring semester
</commit_message>
<xml_diff>
--- a/Lectures/lec00-intro/lec00-course_intro.pptx
+++ b/Lectures/lec00-intro/lec00-course_intro.pptx
@@ -6803,25 +6803,52 @@
           <a:p>
             <a:pPr eaLnBrk="1" hangingPunct="1"/>
             <a:r>
-              <a:rPr lang="en-US" altLang="zh-TW" sz="2400" smtClean="0"/>
+              <a:rPr lang="en-US" altLang="zh-TW" sz="2400" dirty="0" smtClean="0"/>
               <a:t>Homework: 70% (HW implementation)</a:t>
             </a:r>
           </a:p>
           <a:p>
             <a:pPr eaLnBrk="1" hangingPunct="1"/>
             <a:r>
-              <a:rPr lang="en-US" altLang="zh-TW" sz="2400" smtClean="0"/>
-              <a:t>Term project: 50%</a:t>
+              <a:rPr lang="en-US" altLang="zh-TW" sz="2400" dirty="0" smtClean="0"/>
+              <a:t>Term project: </a:t>
+            </a:r>
+            <a:r>
+              <a:rPr lang="en-US" altLang="zh-TW" sz="2400" dirty="0" smtClean="0"/>
+              <a:t>up to 50%</a:t>
             </a:r>
           </a:p>
           <a:p>
             <a:pPr lvl="1" eaLnBrk="1" hangingPunct="1"/>
             <a:r>
-              <a:rPr lang="en-US" altLang="zh-TW" sz="2000" smtClean="0"/>
+              <a:rPr lang="en-US" altLang="zh-TW" sz="2000" dirty="0" err="1" smtClean="0"/>
+              <a:t>Dividor</a:t>
+            </a:r>
+            <a:endParaRPr lang="en-US" altLang="zh-TW" sz="2000" dirty="0" smtClean="0"/>
+          </a:p>
+          <a:p>
+            <a:pPr lvl="1" eaLnBrk="1" hangingPunct="1"/>
+            <a:r>
+              <a:rPr lang="en-US" altLang="zh-TW" sz="2000" dirty="0" smtClean="0"/>
+              <a:t>Floating point unit</a:t>
+            </a:r>
+          </a:p>
+          <a:p>
+            <a:pPr lvl="1" eaLnBrk="1" hangingPunct="1"/>
+            <a:r>
+              <a:rPr lang="en-US" altLang="zh-TW" sz="2000" dirty="0" smtClean="0"/>
+              <a:t>Vector unit</a:t>
+            </a:r>
+            <a:endParaRPr lang="en-US" altLang="zh-TW" sz="2000" dirty="0" smtClean="0"/>
+          </a:p>
+          <a:p>
+            <a:pPr lvl="1" eaLnBrk="1" hangingPunct="1"/>
+            <a:r>
+              <a:rPr lang="en-US" altLang="zh-TW" sz="2000" dirty="0" smtClean="0"/>
               <a:t>Multimedia instruction set extension over </a:t>
             </a:r>
             <a:r>
-              <a:rPr lang="en-US" altLang="zh-TW" sz="2000" smtClean="0">
+              <a:rPr lang="en-US" altLang="zh-TW" sz="2000" dirty="0" smtClean="0">
                 <a:solidFill>
                   <a:srgbClr val="FF0000"/>
                 </a:solidFill>
@@ -6832,48 +6859,51 @@
           <a:p>
             <a:pPr lvl="2" eaLnBrk="1" hangingPunct="1"/>
             <a:r>
-              <a:rPr lang="en-US" altLang="zh-TW" sz="1800" smtClean="0"/>
+              <a:rPr lang="en-US" altLang="zh-TW" sz="1800" dirty="0" smtClean="0"/>
               <a:t>With compiler support (optional)</a:t>
             </a:r>
           </a:p>
           <a:p>
+            <a:pPr lvl="2" eaLnBrk="1" hangingPunct="1"/>
+            <a:r>
+              <a:rPr lang="en-US" altLang="zh-TW" sz="1600" dirty="0" smtClean="0"/>
+              <a:t>To improve performance or energy efficiency over some benchmark </a:t>
+            </a:r>
+            <a:r>
+              <a:rPr lang="en-US" altLang="zh-TW" sz="1600" dirty="0" smtClean="0"/>
+              <a:t>program</a:t>
+            </a:r>
+            <a:endParaRPr lang="en-US" altLang="zh-TW" sz="1800" dirty="0" smtClean="0">
+              <a:solidFill>
+                <a:srgbClr val="FF0000"/>
+              </a:solidFill>
+            </a:endParaRPr>
+          </a:p>
+          <a:p>
             <a:pPr lvl="1" eaLnBrk="1" hangingPunct="1"/>
             <a:r>
-              <a:rPr lang="en-US" altLang="zh-TW" sz="2000" smtClean="0"/>
-              <a:t>To improve performance or energy efficiency over some benchmark program</a:t>
+              <a:rPr lang="en-US" altLang="zh-TW" sz="2400" dirty="0" smtClean="0"/>
+              <a:t>Team work rule:</a:t>
             </a:r>
           </a:p>
           <a:p>
             <a:pPr lvl="2" eaLnBrk="1" hangingPunct="1"/>
             <a:r>
-              <a:rPr lang="en-US" altLang="zh-TW" sz="1800" smtClean="0">
-                <a:solidFill>
-                  <a:srgbClr val="FF0000"/>
-                </a:solidFill>
-              </a:rPr>
-              <a:t>With complex numerical computation</a:t>
-            </a:r>
-          </a:p>
-          <a:p>
-            <a:pPr lvl="1" eaLnBrk="1" hangingPunct="1"/>
-            <a:r>
-              <a:rPr lang="en-US" altLang="zh-TW" sz="2400" smtClean="0"/>
-              <a:t>Team work rule:</a:t>
+              <a:rPr lang="en-US" altLang="zh-TW" sz="2000" dirty="0" smtClean="0"/>
+              <a:t>One person per group if your work is hardware only</a:t>
             </a:r>
           </a:p>
           <a:p>
             <a:pPr lvl="2" eaLnBrk="1" hangingPunct="1"/>
             <a:r>
-              <a:rPr lang="en-US" altLang="zh-TW" sz="2000" smtClean="0"/>
-              <a:t>One person per group if your work is hardware only</a:t>
-            </a:r>
-          </a:p>
-          <a:p>
-            <a:pPr lvl="2" eaLnBrk="1" hangingPunct="1"/>
-            <a:r>
-              <a:rPr lang="en-US" altLang="zh-TW" sz="2000" smtClean="0"/>
-              <a:t>Up to 3 people per group if your work covers HW+compiler</a:t>
-            </a:r>
+              <a:rPr lang="en-US" altLang="zh-TW" sz="2000" dirty="0" smtClean="0"/>
+              <a:t>Up to 3 people per group if your work covers </a:t>
+            </a:r>
+            <a:r>
+              <a:rPr lang="en-US" altLang="zh-TW" sz="2000" dirty="0" err="1" smtClean="0"/>
+              <a:t>HW+compiler</a:t>
+            </a:r>
+            <a:endParaRPr lang="en-US" altLang="zh-TW" sz="2000" dirty="0" smtClean="0"/>
           </a:p>
         </p:txBody>
       </p:sp>
@@ -7120,7 +7150,7 @@
             <a:pPr lvl="1"/>
             <a:r>
               <a:rPr lang="en-US" altLang="zh-TW" dirty="0" smtClean="0"/>
-              <a:t>2018/03/09: </a:t>
+              <a:t>2018/03/08: </a:t>
             </a:r>
             <a:r>
               <a:rPr lang="en-US" altLang="zh-TW" dirty="0" smtClean="0"/>
@@ -7131,25 +7161,23 @@
             <a:pPr lvl="1"/>
             <a:r>
               <a:rPr lang="en-US" altLang="zh-TW" dirty="0" smtClean="0"/>
-              <a:t>2018/03/16: lecture</a:t>
-            </a:r>
-            <a:endParaRPr lang="en-US" altLang="zh-TW" dirty="0" smtClean="0"/>
+              <a:t>2018/03/15: </a:t>
+            </a:r>
+            <a:r>
+              <a:rPr lang="en-US" altLang="zh-TW" dirty="0" smtClean="0"/>
+              <a:t>lecture</a:t>
+            </a:r>
           </a:p>
           <a:p>
             <a:pPr lvl="1"/>
             <a:r>
               <a:rPr lang="en-US" altLang="zh-TW" dirty="0" smtClean="0"/>
-              <a:t>2018/03/23: </a:t>
+              <a:t>2018/03/22: </a:t>
             </a:r>
             <a:r>
               <a:rPr lang="en-US" altLang="zh-TW" dirty="0" smtClean="0"/>
-              <a:t>lab </a:t>
-            </a:r>
-            <a:r>
-              <a:rPr lang="en-US" altLang="zh-TW" dirty="0" smtClean="0"/>
-              <a:t>hour</a:t>
-            </a:r>
-            <a:endParaRPr lang="en-US" altLang="zh-TW" dirty="0" smtClean="0"/>
+              <a:t>lab hour</a:t>
+            </a:r>
           </a:p>
           <a:p>
             <a:r>
@@ -7543,7 +7571,7 @@
           <a:graphicData uri="http://schemas.openxmlformats.org/presentationml/2006/ole">
             <mc:AlternateContent xmlns:mc="http://schemas.openxmlformats.org/markup-compatibility/2006">
               <mc:Choice xmlns:v="urn:schemas-microsoft-com:vml" Requires="v">
-                <p:oleObj spid="_x0000_s6156" name="方程式" r:id="rId3" imgW="1625600" imgH="431800" progId="Equation.3">
+                <p:oleObj spid="_x0000_s6158" name="方程式" r:id="rId3" imgW="1625600" imgH="431800" progId="Equation.3">
                   <p:embed/>
                 </p:oleObj>
               </mc:Choice>

</xml_diff>